<commit_message>
adding license and updated diagram
</commit_message>
<xml_diff>
--- a/resources/xdi2-connector-personal.pptx
+++ b/resources/xdi2-connector-personal.pptx
@@ -196,7 +196,7 @@
             <a:fld id="{B1ACB323-EB0D-6F46-BE28-3F6B6C6249FA}" type="datetimeFigureOut">
               <a:rPr lang="en-US" smtClean="0"/>
               <a:pPr/>
-              <a:t>8/17/2012</a:t>
+              <a:t>8/21/2012</a:t>
             </a:fld>
             <a:endParaRPr lang="en-US"/>
           </a:p>
@@ -364,7 +364,7 @@
             <a:fld id="{659687F0-3512-864A-899D-C30E93E665FC}" type="datetimeFigureOut">
               <a:rPr lang="en-US" smtClean="0"/>
               <a:pPr/>
-              <a:t>8/17/2012</a:t>
+              <a:t>8/21/2012</a:t>
             </a:fld>
             <a:endParaRPr lang="en-US"/>
           </a:p>
@@ -818,7 +818,7 @@
             <a:fld id="{CC19B390-26DE-EC42-9536-DB4D5D42F353}" type="datetime1">
               <a:rPr lang="en-US" smtClean="0"/>
               <a:pPr/>
-              <a:t>8/17/2012</a:t>
+              <a:t>8/21/2012</a:t>
             </a:fld>
             <a:endParaRPr lang="en-US"/>
           </a:p>
@@ -985,7 +985,7 @@
             <a:fld id="{F87380A3-F082-184B-B91D-D15A611F50C5}" type="datetime1">
               <a:rPr lang="en-US" smtClean="0"/>
               <a:pPr/>
-              <a:t>8/17/2012</a:t>
+              <a:t>8/21/2012</a:t>
             </a:fld>
             <a:endParaRPr lang="en-US"/>
           </a:p>
@@ -1162,7 +1162,7 @@
             <a:fld id="{59758453-BBA4-CE44-A510-94BAAAA8F10B}" type="datetime1">
               <a:rPr lang="en-US" smtClean="0"/>
               <a:pPr/>
-              <a:t>8/17/2012</a:t>
+              <a:t>8/21/2012</a:t>
             </a:fld>
             <a:endParaRPr lang="en-US"/>
           </a:p>
@@ -1329,7 +1329,7 @@
             <a:fld id="{4DB4D5F1-4E70-634B-AFDD-C92141017ACE}" type="datetime1">
               <a:rPr lang="en-US" smtClean="0"/>
               <a:pPr/>
-              <a:t>8/17/2012</a:t>
+              <a:t>8/21/2012</a:t>
             </a:fld>
             <a:endParaRPr lang="en-US"/>
           </a:p>
@@ -1572,7 +1572,7 @@
             <a:fld id="{83642C8F-6EF3-6C40-A110-6652134D9B54}" type="datetime1">
               <a:rPr lang="en-US" smtClean="0"/>
               <a:pPr/>
-              <a:t>8/17/2012</a:t>
+              <a:t>8/21/2012</a:t>
             </a:fld>
             <a:endParaRPr lang="en-US"/>
           </a:p>
@@ -1857,7 +1857,7 @@
             <a:fld id="{D79BD240-69C9-8941-987E-F054C3F70DC0}" type="datetime1">
               <a:rPr lang="en-US" smtClean="0"/>
               <a:pPr/>
-              <a:t>8/17/2012</a:t>
+              <a:t>8/21/2012</a:t>
             </a:fld>
             <a:endParaRPr lang="en-US"/>
           </a:p>
@@ -2281,7 +2281,7 @@
             <a:fld id="{8D48398B-5EC2-A54F-9B77-ECC2014EA132}" type="datetime1">
               <a:rPr lang="en-US" smtClean="0"/>
               <a:pPr/>
-              <a:t>8/17/2012</a:t>
+              <a:t>8/21/2012</a:t>
             </a:fld>
             <a:endParaRPr lang="en-US"/>
           </a:p>
@@ -2396,7 +2396,7 @@
             <a:fld id="{C5779240-87A5-4E47-9DCF-A877F1ADEE48}" type="datetime1">
               <a:rPr lang="en-US" smtClean="0"/>
               <a:pPr/>
-              <a:t>8/17/2012</a:t>
+              <a:t>8/21/2012</a:t>
             </a:fld>
             <a:endParaRPr lang="en-US"/>
           </a:p>
@@ -2488,7 +2488,7 @@
             <a:fld id="{F8899BAC-432A-014B-A7BE-81B8A7662BA7}" type="datetime1">
               <a:rPr lang="en-US" smtClean="0"/>
               <a:pPr/>
-              <a:t>8/17/2012</a:t>
+              <a:t>8/21/2012</a:t>
             </a:fld>
             <a:endParaRPr lang="en-US"/>
           </a:p>
@@ -2762,7 +2762,7 @@
             <a:fld id="{73F8D0E9-002B-CD49-B2EA-EA3BEB4C8953}" type="datetime1">
               <a:rPr lang="en-US" smtClean="0"/>
               <a:pPr/>
-              <a:t>8/17/2012</a:t>
+              <a:t>8/21/2012</a:t>
             </a:fld>
             <a:endParaRPr lang="en-US"/>
           </a:p>
@@ -3012,7 +3012,7 @@
             <a:fld id="{9A4C8C76-0E14-CF4C-BA20-2D8AACF85795}" type="datetime1">
               <a:rPr lang="en-US" smtClean="0"/>
               <a:pPr/>
-              <a:t>8/17/2012</a:t>
+              <a:t>8/21/2012</a:t>
             </a:fld>
             <a:endParaRPr lang="en-US"/>
           </a:p>
@@ -3222,7 +3222,7 @@
             <a:fld id="{56489049-FEDB-2345-9323-8517DEF5E780}" type="datetime1">
               <a:rPr lang="en-US" smtClean="0"/>
               <a:pPr/>
-              <a:t>8/17/2012</a:t>
+              <a:t>8/21/2012</a:t>
             </a:fld>
             <a:endParaRPr lang="en-US"/>
           </a:p>
@@ -3794,7 +3794,7 @@
         </p:nvSpPr>
         <p:spPr>
           <a:xfrm>
-            <a:off x="3495555" y="3234289"/>
+            <a:off x="3299663" y="3234289"/>
             <a:ext cx="2268973" cy="537746"/>
           </a:xfrm>
           <a:prstGeom prst="rect">
@@ -4740,7 +4740,7 @@
         </p:nvSpPr>
         <p:spPr>
           <a:xfrm>
-            <a:off x="2286181" y="1777503"/>
+            <a:off x="2163386" y="1777503"/>
             <a:ext cx="2383700" cy="541650"/>
           </a:xfrm>
           <a:prstGeom prst="rect">

</xml_diff>